<commit_message>
Update fig 13.3 to fix #53
</commit_message>
<xml_diff>
--- a/images/survival-kit/update-input-recap.pptx
+++ b/images/survival-kit/update-input-recap.pptx
@@ -104,6 +104,11 @@
       </a:defRPr>
     </a:lvl9pPr>
   </p:defaultTextStyle>
+  <p:extLst>
+    <p:ext uri="{EFAFB233-063F-42B5-8137-9DF3F51BA10A}">
+      <p15:sldGuideLst xmlns:p15="http://schemas.microsoft.com/office/powerpoint/2012/main"/>
+    </p:ext>
+  </p:extLst>
 </p:presentation>
 </file>
 
@@ -238,7 +243,7 @@
           <a:p>
             <a:fld id="{FCB4A38B-9882-854F-A04D-712D578E9A3D}" type="datetimeFigureOut">
               <a:rPr lang="en-CH" smtClean="0"/>
-              <a:t>26.10.20</a:t>
+              <a:t>06.07.21</a:t>
             </a:fld>
             <a:endParaRPr lang="en-CH"/>
           </a:p>
@@ -408,7 +413,7 @@
           <a:p>
             <a:fld id="{FCB4A38B-9882-854F-A04D-712D578E9A3D}" type="datetimeFigureOut">
               <a:rPr lang="en-CH" smtClean="0"/>
-              <a:t>26.10.20</a:t>
+              <a:t>06.07.21</a:t>
             </a:fld>
             <a:endParaRPr lang="en-CH"/>
           </a:p>
@@ -588,7 +593,7 @@
           <a:p>
             <a:fld id="{FCB4A38B-9882-854F-A04D-712D578E9A3D}" type="datetimeFigureOut">
               <a:rPr lang="en-CH" smtClean="0"/>
-              <a:t>26.10.20</a:t>
+              <a:t>06.07.21</a:t>
             </a:fld>
             <a:endParaRPr lang="en-CH"/>
           </a:p>
@@ -758,7 +763,7 @@
           <a:p>
             <a:fld id="{FCB4A38B-9882-854F-A04D-712D578E9A3D}" type="datetimeFigureOut">
               <a:rPr lang="en-CH" smtClean="0"/>
-              <a:t>26.10.20</a:t>
+              <a:t>06.07.21</a:t>
             </a:fld>
             <a:endParaRPr lang="en-CH"/>
           </a:p>
@@ -1002,7 +1007,7 @@
           <a:p>
             <a:fld id="{FCB4A38B-9882-854F-A04D-712D578E9A3D}" type="datetimeFigureOut">
               <a:rPr lang="en-CH" smtClean="0"/>
-              <a:t>26.10.20</a:t>
+              <a:t>06.07.21</a:t>
             </a:fld>
             <a:endParaRPr lang="en-CH"/>
           </a:p>
@@ -1234,7 +1239,7 @@
           <a:p>
             <a:fld id="{FCB4A38B-9882-854F-A04D-712D578E9A3D}" type="datetimeFigureOut">
               <a:rPr lang="en-CH" smtClean="0"/>
-              <a:t>26.10.20</a:t>
+              <a:t>06.07.21</a:t>
             </a:fld>
             <a:endParaRPr lang="en-CH"/>
           </a:p>
@@ -1601,7 +1606,7 @@
           <a:p>
             <a:fld id="{FCB4A38B-9882-854F-A04D-712D578E9A3D}" type="datetimeFigureOut">
               <a:rPr lang="en-CH" smtClean="0"/>
-              <a:t>26.10.20</a:t>
+              <a:t>06.07.21</a:t>
             </a:fld>
             <a:endParaRPr lang="en-CH"/>
           </a:p>
@@ -1719,7 +1724,7 @@
           <a:p>
             <a:fld id="{FCB4A38B-9882-854F-A04D-712D578E9A3D}" type="datetimeFigureOut">
               <a:rPr lang="en-CH" smtClean="0"/>
-              <a:t>26.10.20</a:t>
+              <a:t>06.07.21</a:t>
             </a:fld>
             <a:endParaRPr lang="en-CH"/>
           </a:p>
@@ -1814,7 +1819,7 @@
           <a:p>
             <a:fld id="{FCB4A38B-9882-854F-A04D-712D578E9A3D}" type="datetimeFigureOut">
               <a:rPr lang="en-CH" smtClean="0"/>
-              <a:t>26.10.20</a:t>
+              <a:t>06.07.21</a:t>
             </a:fld>
             <a:endParaRPr lang="en-CH"/>
           </a:p>
@@ -2091,7 +2096,7 @@
           <a:p>
             <a:fld id="{FCB4A38B-9882-854F-A04D-712D578E9A3D}" type="datetimeFigureOut">
               <a:rPr lang="en-CH" smtClean="0"/>
-              <a:t>26.10.20</a:t>
+              <a:t>06.07.21</a:t>
             </a:fld>
             <a:endParaRPr lang="en-CH"/>
           </a:p>
@@ -2348,7 +2353,7 @@
           <a:p>
             <a:fld id="{FCB4A38B-9882-854F-A04D-712D578E9A3D}" type="datetimeFigureOut">
               <a:rPr lang="en-CH" smtClean="0"/>
-              <a:t>26.10.20</a:t>
+              <a:t>06.07.21</a:t>
             </a:fld>
             <a:endParaRPr lang="en-CH"/>
           </a:p>
@@ -2561,7 +2566,7 @@
           <a:p>
             <a:fld id="{FCB4A38B-9882-854F-A04D-712D578E9A3D}" type="datetimeFigureOut">
               <a:rPr lang="en-CH" smtClean="0"/>
-              <a:t>26.10.20</a:t>
+              <a:t>06.07.21</a:t>
             </a:fld>
             <a:endParaRPr lang="en-CH"/>
           </a:p>
@@ -3154,7 +3159,8 @@
             <a:avLst/>
           </a:prstGeom>
           <a:solidFill>
-            <a:schemeClr val="tx1">
+            <a:schemeClr val="bg1">
+              <a:lumMod val="50000"/>
               <a:alpha val="61000"/>
             </a:schemeClr>
           </a:solidFill>
@@ -3381,7 +3387,7 @@
         </p:nvSpPr>
         <p:spPr>
           <a:xfrm>
-            <a:off x="93187" y="9232480"/>
+            <a:off x="-49405" y="4644989"/>
             <a:ext cx="2372444" cy="369332"/>
           </a:xfrm>
           <a:prstGeom prst="rect">
@@ -3579,8 +3585,8 @@
         </p:nvSpPr>
         <p:spPr>
           <a:xfrm>
-            <a:off x="422268" y="9576801"/>
-            <a:ext cx="3412972" cy="369332"/>
+            <a:off x="422267" y="9576801"/>
+            <a:ext cx="4251049" cy="369332"/>
           </a:xfrm>
           <a:prstGeom prst="rect">
             <a:avLst/>
@@ -3595,7 +3601,7 @@
           <a:p>
             <a:r>
               <a:rPr lang="en-CH" dirty="0"/>
-              <a:t>Handlers: internal + external</a:t>
+              <a:t>Handlers: internal + external (user defined)</a:t>
             </a:r>
           </a:p>
         </p:txBody>
@@ -3813,7 +3819,7 @@
             </a:r>
             <a:r>
               <a:rPr lang="en-CH" sz="1600" dirty="0"/>
-              <a:t>ocates the good handler</a:t>
+              <a:t>ocates the correct handler</a:t>
             </a:r>
           </a:p>
         </p:txBody>
@@ -4962,8 +4968,8 @@
         </p:nvSpPr>
         <p:spPr>
           <a:xfrm>
-            <a:off x="2655847" y="5692314"/>
-            <a:ext cx="1040904" cy="923330"/>
+            <a:off x="2147199" y="5908738"/>
+            <a:ext cx="2178195" cy="338554"/>
           </a:xfrm>
           <a:prstGeom prst="rect">
             <a:avLst/>
@@ -4977,11 +4983,11 @@
           <a:lstStyle/>
           <a:p>
             <a:r>
-              <a:rPr lang="en-GB" dirty="0"/>
+              <a:rPr lang="en-GB" sz="1600" dirty="0"/>
               <a:t>M</a:t>
             </a:r>
             <a:r>
-              <a:rPr lang="en-CH" dirty="0"/>
+              <a:rPr lang="en-CH" sz="1600" dirty="0"/>
               <a:t>odal, notifications, …</a:t>
             </a:r>
           </a:p>
@@ -5018,53 +5024,6 @@
             <a:r>
               <a:rPr lang="en-CH" dirty="0"/>
               <a:t>trigger</a:t>
-            </a:r>
-          </a:p>
-        </p:txBody>
-      </p:sp>
-      <p:sp>
-        <p:nvSpPr>
-          <p:cNvPr id="73" name="TextBox 72">
-            <a:extLst>
-              <a:ext uri="{FF2B5EF4-FFF2-40B4-BE49-F238E27FC236}">
-                <a16:creationId xmlns:a16="http://schemas.microsoft.com/office/drawing/2014/main" id="{D62CEB45-6E5B-7144-B2C9-17E946C8BDE5}"/>
-              </a:ext>
-            </a:extLst>
-          </p:cNvPr>
-          <p:cNvSpPr txBox="1"/>
-          <p:nvPr/>
-        </p:nvSpPr>
-        <p:spPr>
-          <a:xfrm>
-            <a:off x="1522769" y="8452509"/>
-            <a:ext cx="1683025" cy="369332"/>
-          </a:xfrm>
-          <a:prstGeom prst="rect">
-            <a:avLst/>
-          </a:prstGeom>
-          <a:noFill/>
-        </p:spPr>
-        <p:txBody>
-          <a:bodyPr wrap="none" rtlCol="0">
-            <a:spAutoFit/>
-          </a:bodyPr>
-          <a:lstStyle/>
-          <a:p>
-            <a:r>
-              <a:rPr lang="en-GB" b="1" dirty="0">
-                <a:solidFill>
-                  <a:srgbClr val="FF0000"/>
-                </a:solidFill>
-              </a:rPr>
-              <a:t>R</a:t>
-            </a:r>
-            <a:r>
-              <a:rPr lang="en-CH" b="1" dirty="0">
-                <a:solidFill>
-                  <a:srgbClr val="FF0000"/>
-                </a:solidFill>
-              </a:rPr>
-              <a:t>ather complex</a:t>
             </a:r>
           </a:p>
         </p:txBody>

</xml_diff>